<commit_message>
Poniendo contenido 12 13 14
</commit_message>
<xml_diff>
--- a/doc/worktab.pptx
+++ b/doc/worktab.pptx
@@ -332,7 +332,7 @@
           </a:lstStyle>
           <a:p>
             <a:r>
-              <a:rPr lang="es-ES" smtClean="0"/>
+              <a:rPr lang="es-ES"/>
               <a:t>Haga clic para modificar el estilo de título del patrón</a:t>
             </a:r>
             <a:endParaRPr lang="en-US" dirty="0"/>
@@ -451,7 +451,7 @@
           </a:lstStyle>
           <a:p>
             <a:r>
-              <a:rPr lang="es-ES" smtClean="0"/>
+              <a:rPr lang="es-ES"/>
               <a:t>Haga clic para editar el estilo de subtítulo del patrón</a:t>
             </a:r>
             <a:endParaRPr lang="en-US" dirty="0"/>
@@ -480,7 +480,7 @@
           <a:p>
             <a:fld id="{40636F93-AAE2-4FC4-B77D-02B590E4C869}" type="datetimeFigureOut">
               <a:rPr lang="es-ES" smtClean="0"/>
-              <a:t>19/05/2022</a:t>
+              <a:t>22/05/2022</a:t>
             </a:fld>
             <a:endParaRPr lang="es-ES"/>
           </a:p>
@@ -625,7 +625,7 @@
           </a:lstStyle>
           <a:p>
             <a:r>
-              <a:rPr lang="es-ES" smtClean="0"/>
+              <a:rPr lang="es-ES"/>
               <a:t>Haga clic para modificar el estilo de título del patrón</a:t>
             </a:r>
             <a:endParaRPr lang="en-US" dirty="0"/>
@@ -713,7 +713,7 @@
           </a:lstStyle>
           <a:p>
             <a:r>
-              <a:rPr lang="es-ES" smtClean="0"/>
+              <a:rPr lang="es-ES"/>
               <a:t>Haga clic en el icono para agregar una imagen</a:t>
             </a:r>
             <a:endParaRPr lang="en-US" dirty="0"/>
@@ -781,7 +781,7 @@
           <a:p>
             <a:pPr lvl="0"/>
             <a:r>
-              <a:rPr lang="es-ES" smtClean="0"/>
+              <a:rPr lang="es-ES"/>
               <a:t>Editar el estilo de texto del patrón</a:t>
             </a:r>
           </a:p>
@@ -804,7 +804,7 @@
           <a:p>
             <a:fld id="{40636F93-AAE2-4FC4-B77D-02B590E4C869}" type="datetimeFigureOut">
               <a:rPr lang="es-ES" smtClean="0"/>
-              <a:t>19/05/2022</a:t>
+              <a:t>22/05/2022</a:t>
             </a:fld>
             <a:endParaRPr lang="es-ES"/>
           </a:p>
@@ -909,7 +909,7 @@
           </a:lstStyle>
           <a:p>
             <a:r>
-              <a:rPr lang="es-ES" smtClean="0"/>
+              <a:rPr lang="es-ES"/>
               <a:t>Haga clic para modificar el estilo de título del patrón</a:t>
             </a:r>
             <a:endParaRPr lang="en-US" dirty="0"/>
@@ -1029,7 +1029,7 @@
           <a:p>
             <a:pPr lvl="0"/>
             <a:r>
-              <a:rPr lang="es-ES" smtClean="0"/>
+              <a:rPr lang="es-ES"/>
               <a:t>Editar el estilo de texto del patrón</a:t>
             </a:r>
           </a:p>
@@ -1052,7 +1052,7 @@
           <a:p>
             <a:fld id="{40636F93-AAE2-4FC4-B77D-02B590E4C869}" type="datetimeFigureOut">
               <a:rPr lang="es-ES" smtClean="0"/>
-              <a:t>19/05/2022</a:t>
+              <a:t>22/05/2022</a:t>
             </a:fld>
             <a:endParaRPr lang="es-ES"/>
           </a:p>
@@ -1192,7 +1192,7 @@
           </a:lstStyle>
           <a:p>
             <a:r>
-              <a:rPr lang="es-ES" smtClean="0"/>
+              <a:rPr lang="es-ES"/>
               <a:t>Haga clic para modificar el estilo de título del patrón</a:t>
             </a:r>
             <a:endParaRPr lang="en-US" dirty="0"/>
@@ -1249,7 +1249,7 @@
           <a:p>
             <a:pPr lvl="0"/>
             <a:r>
-              <a:rPr lang="es-ES" smtClean="0"/>
+              <a:rPr lang="es-ES"/>
               <a:t>Editar el estilo de texto del patrón</a:t>
             </a:r>
           </a:p>
@@ -1368,7 +1368,7 @@
           <a:p>
             <a:pPr lvl="0"/>
             <a:r>
-              <a:rPr lang="es-ES" smtClean="0"/>
+              <a:rPr lang="es-ES"/>
               <a:t>Editar el estilo de texto del patrón</a:t>
             </a:r>
           </a:p>
@@ -1391,7 +1391,7 @@
           <a:p>
             <a:fld id="{40636F93-AAE2-4FC4-B77D-02B590E4C869}" type="datetimeFigureOut">
               <a:rPr lang="es-ES" smtClean="0"/>
-              <a:t>19/05/2022</a:t>
+              <a:t>22/05/2022</a:t>
             </a:fld>
             <a:endParaRPr lang="es-ES"/>
           </a:p>
@@ -1595,7 +1595,7 @@
           </a:lstStyle>
           <a:p>
             <a:r>
-              <a:rPr lang="es-ES" smtClean="0"/>
+              <a:rPr lang="es-ES"/>
               <a:t>Haga clic para modificar el estilo de título del patrón</a:t>
             </a:r>
             <a:endParaRPr lang="en-US" dirty="0"/>
@@ -1715,7 +1715,7 @@
           <a:p>
             <a:pPr lvl="0"/>
             <a:r>
-              <a:rPr lang="es-ES" smtClean="0"/>
+              <a:rPr lang="es-ES"/>
               <a:t>Editar el estilo de texto del patrón</a:t>
             </a:r>
           </a:p>
@@ -1738,7 +1738,7 @@
           <a:p>
             <a:fld id="{40636F93-AAE2-4FC4-B77D-02B590E4C869}" type="datetimeFigureOut">
               <a:rPr lang="es-ES" smtClean="0"/>
-              <a:t>19/05/2022</a:t>
+              <a:t>22/05/2022</a:t>
             </a:fld>
             <a:endParaRPr lang="es-ES"/>
           </a:p>
@@ -1847,7 +1847,7 @@
           </a:lstStyle>
           <a:p>
             <a:r>
-              <a:rPr lang="es-ES" smtClean="0"/>
+              <a:rPr lang="es-ES"/>
               <a:t>Haga clic para modificar el estilo de título del patrón</a:t>
             </a:r>
             <a:endParaRPr lang="en-US" dirty="0"/>
@@ -1970,7 +1970,7 @@
           <a:p>
             <a:pPr lvl="0"/>
             <a:r>
-              <a:rPr lang="es-ES" smtClean="0"/>
+              <a:rPr lang="es-ES"/>
               <a:t>Editar el estilo de texto del patrón</a:t>
             </a:r>
           </a:p>
@@ -2089,7 +2089,7 @@
           <a:p>
             <a:pPr lvl="0"/>
             <a:r>
-              <a:rPr lang="es-ES" smtClean="0"/>
+              <a:rPr lang="es-ES"/>
               <a:t>Editar el estilo de texto del patrón</a:t>
             </a:r>
           </a:p>
@@ -2112,7 +2112,7 @@
           <a:p>
             <a:fld id="{40636F93-AAE2-4FC4-B77D-02B590E4C869}" type="datetimeFigureOut">
               <a:rPr lang="es-ES" smtClean="0"/>
-              <a:t>19/05/2022</a:t>
+              <a:t>22/05/2022</a:t>
             </a:fld>
             <a:endParaRPr lang="es-ES"/>
           </a:p>
@@ -2317,7 +2317,7 @@
           <a:p>
             <a:pPr marL="0" lvl="0"/>
             <a:r>
-              <a:rPr lang="es-ES" smtClean="0"/>
+              <a:rPr lang="es-ES"/>
               <a:t>Haga clic para modificar el estilo de título del patrón</a:t>
             </a:r>
             <a:endParaRPr lang="en-US" dirty="0"/>
@@ -2440,7 +2440,7 @@
           <a:p>
             <a:pPr lvl="0"/>
             <a:r>
-              <a:rPr lang="es-ES" smtClean="0"/>
+              <a:rPr lang="es-ES"/>
               <a:t>Editar el estilo de texto del patrón</a:t>
             </a:r>
           </a:p>
@@ -2559,7 +2559,7 @@
           <a:p>
             <a:pPr lvl="0"/>
             <a:r>
-              <a:rPr lang="es-ES" smtClean="0"/>
+              <a:rPr lang="es-ES"/>
               <a:t>Editar el estilo de texto del patrón</a:t>
             </a:r>
           </a:p>
@@ -2582,7 +2582,7 @@
           <a:p>
             <a:fld id="{40636F93-AAE2-4FC4-B77D-02B590E4C869}" type="datetimeFigureOut">
               <a:rPr lang="es-ES" smtClean="0"/>
-              <a:t>19/05/2022</a:t>
+              <a:t>22/05/2022</a:t>
             </a:fld>
             <a:endParaRPr lang="es-ES"/>
           </a:p>
@@ -2711,7 +2711,7 @@
           </a:lstStyle>
           <a:p>
             <a:r>
-              <a:rPr lang="es-ES" smtClean="0"/>
+              <a:rPr lang="es-ES"/>
               <a:t>Haga clic para modificar el estilo de título del patrón</a:t>
             </a:r>
             <a:endParaRPr lang="en-US" dirty="0"/>
@@ -2735,35 +2735,35 @@
           <a:p>
             <a:pPr lvl="0"/>
             <a:r>
-              <a:rPr lang="es-ES" smtClean="0"/>
+              <a:rPr lang="es-ES"/>
               <a:t>Editar el estilo de texto del patrón</a:t>
             </a:r>
           </a:p>
           <a:p>
             <a:pPr lvl="1"/>
             <a:r>
-              <a:rPr lang="es-ES" smtClean="0"/>
+              <a:rPr lang="es-ES"/>
               <a:t>Segundo nivel</a:t>
             </a:r>
           </a:p>
           <a:p>
             <a:pPr lvl="2"/>
             <a:r>
-              <a:rPr lang="es-ES" smtClean="0"/>
+              <a:rPr lang="es-ES"/>
               <a:t>Tercer nivel</a:t>
             </a:r>
           </a:p>
           <a:p>
             <a:pPr lvl="3"/>
             <a:r>
-              <a:rPr lang="es-ES" smtClean="0"/>
+              <a:rPr lang="es-ES"/>
               <a:t>Cuarto nivel</a:t>
             </a:r>
           </a:p>
           <a:p>
             <a:pPr lvl="4"/>
             <a:r>
-              <a:rPr lang="es-ES" smtClean="0"/>
+              <a:rPr lang="es-ES"/>
               <a:t>Quinto nivel</a:t>
             </a:r>
             <a:endParaRPr lang="en-US" dirty="0"/>
@@ -2787,7 +2787,7 @@
           <a:p>
             <a:fld id="{40636F93-AAE2-4FC4-B77D-02B590E4C869}" type="datetimeFigureOut">
               <a:rPr lang="es-ES" smtClean="0"/>
-              <a:t>19/05/2022</a:t>
+              <a:t>22/05/2022</a:t>
             </a:fld>
             <a:endParaRPr lang="es-ES"/>
           </a:p>
@@ -2917,7 +2917,7 @@
           <a:lstStyle/>
           <a:p>
             <a:r>
-              <a:rPr lang="es-ES" smtClean="0"/>
+              <a:rPr lang="es-ES"/>
               <a:t>Haga clic para modificar el estilo de título del patrón</a:t>
             </a:r>
             <a:endParaRPr lang="en-US" dirty="0"/>
@@ -2946,35 +2946,35 @@
           <a:p>
             <a:pPr lvl="0"/>
             <a:r>
-              <a:rPr lang="es-ES" smtClean="0"/>
+              <a:rPr lang="es-ES"/>
               <a:t>Editar el estilo de texto del patrón</a:t>
             </a:r>
           </a:p>
           <a:p>
             <a:pPr lvl="1"/>
             <a:r>
-              <a:rPr lang="es-ES" smtClean="0"/>
+              <a:rPr lang="es-ES"/>
               <a:t>Segundo nivel</a:t>
             </a:r>
           </a:p>
           <a:p>
             <a:pPr lvl="2"/>
             <a:r>
-              <a:rPr lang="es-ES" smtClean="0"/>
+              <a:rPr lang="es-ES"/>
               <a:t>Tercer nivel</a:t>
             </a:r>
           </a:p>
           <a:p>
             <a:pPr lvl="3"/>
             <a:r>
-              <a:rPr lang="es-ES" smtClean="0"/>
+              <a:rPr lang="es-ES"/>
               <a:t>Cuarto nivel</a:t>
             </a:r>
           </a:p>
           <a:p>
             <a:pPr lvl="4"/>
             <a:r>
-              <a:rPr lang="es-ES" smtClean="0"/>
+              <a:rPr lang="es-ES"/>
               <a:t>Quinto nivel</a:t>
             </a:r>
             <a:endParaRPr lang="en-US" dirty="0"/>
@@ -2998,7 +2998,7 @@
           <a:p>
             <a:fld id="{40636F93-AAE2-4FC4-B77D-02B590E4C869}" type="datetimeFigureOut">
               <a:rPr lang="es-ES" smtClean="0"/>
-              <a:t>19/05/2022</a:t>
+              <a:t>22/05/2022</a:t>
             </a:fld>
             <a:endParaRPr lang="es-ES"/>
           </a:p>
@@ -3154,7 +3154,7 @@
           <a:lstStyle/>
           <a:p>
             <a:r>
-              <a:rPr lang="es-ES" smtClean="0"/>
+              <a:rPr lang="es-ES"/>
               <a:t>Haga clic para modificar el estilo de título del patrón</a:t>
             </a:r>
             <a:endParaRPr lang="en-US" dirty="0"/>
@@ -3178,35 +3178,35 @@
           <a:p>
             <a:pPr lvl="0"/>
             <a:r>
-              <a:rPr lang="es-ES" smtClean="0"/>
+              <a:rPr lang="es-ES"/>
               <a:t>Editar el estilo de texto del patrón</a:t>
             </a:r>
           </a:p>
           <a:p>
             <a:pPr lvl="1"/>
             <a:r>
-              <a:rPr lang="es-ES" smtClean="0"/>
+              <a:rPr lang="es-ES"/>
               <a:t>Segundo nivel</a:t>
             </a:r>
           </a:p>
           <a:p>
             <a:pPr lvl="2"/>
             <a:r>
-              <a:rPr lang="es-ES" smtClean="0"/>
+              <a:rPr lang="es-ES"/>
               <a:t>Tercer nivel</a:t>
             </a:r>
           </a:p>
           <a:p>
             <a:pPr lvl="3"/>
             <a:r>
-              <a:rPr lang="es-ES" smtClean="0"/>
+              <a:rPr lang="es-ES"/>
               <a:t>Cuarto nivel</a:t>
             </a:r>
           </a:p>
           <a:p>
             <a:pPr lvl="4"/>
             <a:r>
-              <a:rPr lang="es-ES" smtClean="0"/>
+              <a:rPr lang="es-ES"/>
               <a:t>Quinto nivel</a:t>
             </a:r>
             <a:endParaRPr lang="en-US" dirty="0"/>
@@ -3230,7 +3230,7 @@
           <a:p>
             <a:fld id="{40636F93-AAE2-4FC4-B77D-02B590E4C869}" type="datetimeFigureOut">
               <a:rPr lang="es-ES" smtClean="0"/>
-              <a:t>19/05/2022</a:t>
+              <a:t>22/05/2022</a:t>
             </a:fld>
             <a:endParaRPr lang="es-ES"/>
           </a:p>
@@ -3335,7 +3335,7 @@
           </a:lstStyle>
           <a:p>
             <a:r>
-              <a:rPr lang="es-ES" smtClean="0"/>
+              <a:rPr lang="es-ES"/>
               <a:t>Haga clic para modificar el estilo de título del patrón</a:t>
             </a:r>
             <a:endParaRPr lang="en-US" dirty="0"/>
@@ -3455,7 +3455,7 @@
           <a:p>
             <a:pPr lvl="0"/>
             <a:r>
-              <a:rPr lang="es-ES" smtClean="0"/>
+              <a:rPr lang="es-ES"/>
               <a:t>Editar el estilo de texto del patrón</a:t>
             </a:r>
           </a:p>
@@ -3478,7 +3478,7 @@
           <a:p>
             <a:fld id="{40636F93-AAE2-4FC4-B77D-02B590E4C869}" type="datetimeFigureOut">
               <a:rPr lang="es-ES" smtClean="0"/>
-              <a:t>19/05/2022</a:t>
+              <a:t>22/05/2022</a:t>
             </a:fld>
             <a:endParaRPr lang="es-ES"/>
           </a:p>
@@ -3634,7 +3634,7 @@
           <a:lstStyle/>
           <a:p>
             <a:r>
-              <a:rPr lang="es-ES" smtClean="0"/>
+              <a:rPr lang="es-ES"/>
               <a:t>Haga clic para modificar el estilo de título del patrón</a:t>
             </a:r>
             <a:endParaRPr lang="en-US" dirty="0"/>
@@ -3665,35 +3665,35 @@
           <a:p>
             <a:pPr lvl="0"/>
             <a:r>
-              <a:rPr lang="es-ES" smtClean="0"/>
+              <a:rPr lang="es-ES"/>
               <a:t>Editar el estilo de texto del patrón</a:t>
             </a:r>
           </a:p>
           <a:p>
             <a:pPr lvl="1"/>
             <a:r>
-              <a:rPr lang="es-ES" smtClean="0"/>
+              <a:rPr lang="es-ES"/>
               <a:t>Segundo nivel</a:t>
             </a:r>
           </a:p>
           <a:p>
             <a:pPr lvl="2"/>
             <a:r>
-              <a:rPr lang="es-ES" smtClean="0"/>
+              <a:rPr lang="es-ES"/>
               <a:t>Tercer nivel</a:t>
             </a:r>
           </a:p>
           <a:p>
             <a:pPr lvl="3"/>
             <a:r>
-              <a:rPr lang="es-ES" smtClean="0"/>
+              <a:rPr lang="es-ES"/>
               <a:t>Cuarto nivel</a:t>
             </a:r>
           </a:p>
           <a:p>
             <a:pPr lvl="4"/>
             <a:r>
-              <a:rPr lang="es-ES" smtClean="0"/>
+              <a:rPr lang="es-ES"/>
               <a:t>Quinto nivel</a:t>
             </a:r>
             <a:endParaRPr lang="en-US" dirty="0"/>
@@ -3724,35 +3724,35 @@
           <a:p>
             <a:pPr lvl="0"/>
             <a:r>
-              <a:rPr lang="es-ES" smtClean="0"/>
+              <a:rPr lang="es-ES"/>
               <a:t>Editar el estilo de texto del patrón</a:t>
             </a:r>
           </a:p>
           <a:p>
             <a:pPr lvl="1"/>
             <a:r>
-              <a:rPr lang="es-ES" smtClean="0"/>
+              <a:rPr lang="es-ES"/>
               <a:t>Segundo nivel</a:t>
             </a:r>
           </a:p>
           <a:p>
             <a:pPr lvl="2"/>
             <a:r>
-              <a:rPr lang="es-ES" smtClean="0"/>
+              <a:rPr lang="es-ES"/>
               <a:t>Tercer nivel</a:t>
             </a:r>
           </a:p>
           <a:p>
             <a:pPr lvl="3"/>
             <a:r>
-              <a:rPr lang="es-ES" smtClean="0"/>
+              <a:rPr lang="es-ES"/>
               <a:t>Cuarto nivel</a:t>
             </a:r>
           </a:p>
           <a:p>
             <a:pPr lvl="4"/>
             <a:r>
-              <a:rPr lang="es-ES" smtClean="0"/>
+              <a:rPr lang="es-ES"/>
               <a:t>Quinto nivel</a:t>
             </a:r>
             <a:endParaRPr lang="en-US" dirty="0"/>
@@ -3776,7 +3776,7 @@
           <a:p>
             <a:fld id="{40636F93-AAE2-4FC4-B77D-02B590E4C869}" type="datetimeFigureOut">
               <a:rPr lang="es-ES" smtClean="0"/>
-              <a:t>19/05/2022</a:t>
+              <a:t>22/05/2022</a:t>
             </a:fld>
             <a:endParaRPr lang="es-ES"/>
           </a:p>
@@ -3874,7 +3874,7 @@
           </a:lstStyle>
           <a:p>
             <a:r>
-              <a:rPr lang="es-ES" smtClean="0"/>
+              <a:rPr lang="es-ES"/>
               <a:t>Haga clic para modificar el estilo de título del patrón</a:t>
             </a:r>
             <a:endParaRPr lang="en-US" dirty="0"/>
@@ -3952,7 +3952,7 @@
           <a:p>
             <a:pPr lvl="0"/>
             <a:r>
-              <a:rPr lang="es-ES" smtClean="0"/>
+              <a:rPr lang="es-ES"/>
               <a:t>Editar el estilo de texto del patrón</a:t>
             </a:r>
           </a:p>
@@ -3982,35 +3982,35 @@
           <a:p>
             <a:pPr lvl="0"/>
             <a:r>
-              <a:rPr lang="es-ES" smtClean="0"/>
+              <a:rPr lang="es-ES"/>
               <a:t>Editar el estilo de texto del patrón</a:t>
             </a:r>
           </a:p>
           <a:p>
             <a:pPr lvl="1"/>
             <a:r>
-              <a:rPr lang="es-ES" smtClean="0"/>
+              <a:rPr lang="es-ES"/>
               <a:t>Segundo nivel</a:t>
             </a:r>
           </a:p>
           <a:p>
             <a:pPr lvl="2"/>
             <a:r>
-              <a:rPr lang="es-ES" smtClean="0"/>
+              <a:rPr lang="es-ES"/>
               <a:t>Tercer nivel</a:t>
             </a:r>
           </a:p>
           <a:p>
             <a:pPr lvl="3"/>
             <a:r>
-              <a:rPr lang="es-ES" smtClean="0"/>
+              <a:rPr lang="es-ES"/>
               <a:t>Cuarto nivel</a:t>
             </a:r>
           </a:p>
           <a:p>
             <a:pPr lvl="4"/>
             <a:r>
-              <a:rPr lang="es-ES" smtClean="0"/>
+              <a:rPr lang="es-ES"/>
               <a:t>Quinto nivel</a:t>
             </a:r>
             <a:endParaRPr lang="en-US" dirty="0"/>
@@ -4088,7 +4088,7 @@
           <a:p>
             <a:pPr lvl="0"/>
             <a:r>
-              <a:rPr lang="es-ES" smtClean="0"/>
+              <a:rPr lang="es-ES"/>
               <a:t>Editar el estilo de texto del patrón</a:t>
             </a:r>
           </a:p>
@@ -4118,35 +4118,35 @@
           <a:p>
             <a:pPr lvl="0"/>
             <a:r>
-              <a:rPr lang="es-ES" smtClean="0"/>
+              <a:rPr lang="es-ES"/>
               <a:t>Editar el estilo de texto del patrón</a:t>
             </a:r>
           </a:p>
           <a:p>
             <a:pPr lvl="1"/>
             <a:r>
-              <a:rPr lang="es-ES" smtClean="0"/>
+              <a:rPr lang="es-ES"/>
               <a:t>Segundo nivel</a:t>
             </a:r>
           </a:p>
           <a:p>
             <a:pPr lvl="2"/>
             <a:r>
-              <a:rPr lang="es-ES" smtClean="0"/>
+              <a:rPr lang="es-ES"/>
               <a:t>Tercer nivel</a:t>
             </a:r>
           </a:p>
           <a:p>
             <a:pPr lvl="3"/>
             <a:r>
-              <a:rPr lang="es-ES" smtClean="0"/>
+              <a:rPr lang="es-ES"/>
               <a:t>Cuarto nivel</a:t>
             </a:r>
           </a:p>
           <a:p>
             <a:pPr lvl="4"/>
             <a:r>
-              <a:rPr lang="es-ES" smtClean="0"/>
+              <a:rPr lang="es-ES"/>
               <a:t>Quinto nivel</a:t>
             </a:r>
             <a:endParaRPr lang="en-US" dirty="0"/>
@@ -4170,7 +4170,7 @@
           <a:p>
             <a:fld id="{40636F93-AAE2-4FC4-B77D-02B590E4C869}" type="datetimeFigureOut">
               <a:rPr lang="es-ES" smtClean="0"/>
-              <a:t>19/05/2022</a:t>
+              <a:t>22/05/2022</a:t>
             </a:fld>
             <a:endParaRPr lang="es-ES"/>
           </a:p>
@@ -4295,7 +4295,7 @@
           <a:lstStyle/>
           <a:p>
             <a:r>
-              <a:rPr lang="es-ES" smtClean="0"/>
+              <a:rPr lang="es-ES"/>
               <a:t>Haga clic para modificar el estilo de título del patrón</a:t>
             </a:r>
             <a:endParaRPr lang="en-US" dirty="0"/>
@@ -4319,7 +4319,7 @@
           <a:p>
             <a:fld id="{40636F93-AAE2-4FC4-B77D-02B590E4C869}" type="datetimeFigureOut">
               <a:rPr lang="es-ES" smtClean="0"/>
-              <a:t>19/05/2022</a:t>
+              <a:t>22/05/2022</a:t>
             </a:fld>
             <a:endParaRPr lang="es-ES"/>
           </a:p>
@@ -4445,7 +4445,7 @@
           <a:p>
             <a:fld id="{40636F93-AAE2-4FC4-B77D-02B590E4C869}" type="datetimeFigureOut">
               <a:rPr lang="es-ES" smtClean="0"/>
-              <a:t>19/05/2022</a:t>
+              <a:t>22/05/2022</a:t>
             </a:fld>
             <a:endParaRPr lang="es-ES"/>
           </a:p>
@@ -4550,7 +4550,7 @@
           </a:lstStyle>
           <a:p>
             <a:r>
-              <a:rPr lang="es-ES" smtClean="0"/>
+              <a:rPr lang="es-ES"/>
               <a:t>Haga clic para modificar el estilo de título del patrón</a:t>
             </a:r>
             <a:endParaRPr lang="en-US" dirty="0"/>
@@ -4581,35 +4581,35 @@
           <a:p>
             <a:pPr lvl="0"/>
             <a:r>
-              <a:rPr lang="es-ES" smtClean="0"/>
+              <a:rPr lang="es-ES"/>
               <a:t>Editar el estilo de texto del patrón</a:t>
             </a:r>
           </a:p>
           <a:p>
             <a:pPr lvl="1"/>
             <a:r>
-              <a:rPr lang="es-ES" smtClean="0"/>
+              <a:rPr lang="es-ES"/>
               <a:t>Segundo nivel</a:t>
             </a:r>
           </a:p>
           <a:p>
             <a:pPr lvl="2"/>
             <a:r>
-              <a:rPr lang="es-ES" smtClean="0"/>
+              <a:rPr lang="es-ES"/>
               <a:t>Tercer nivel</a:t>
             </a:r>
           </a:p>
           <a:p>
             <a:pPr lvl="3"/>
             <a:r>
-              <a:rPr lang="es-ES" smtClean="0"/>
+              <a:rPr lang="es-ES"/>
               <a:t>Cuarto nivel</a:t>
             </a:r>
           </a:p>
           <a:p>
             <a:pPr lvl="4"/>
             <a:r>
-              <a:rPr lang="es-ES" smtClean="0"/>
+              <a:rPr lang="es-ES"/>
               <a:t>Quinto nivel</a:t>
             </a:r>
             <a:endParaRPr lang="en-US" dirty="0"/>
@@ -4677,7 +4677,7 @@
           <a:p>
             <a:pPr lvl="0"/>
             <a:r>
-              <a:rPr lang="es-ES" smtClean="0"/>
+              <a:rPr lang="es-ES"/>
               <a:t>Editar el estilo de texto del patrón</a:t>
             </a:r>
           </a:p>
@@ -4700,7 +4700,7 @@
           <a:p>
             <a:fld id="{40636F93-AAE2-4FC4-B77D-02B590E4C869}" type="datetimeFigureOut">
               <a:rPr lang="es-ES" smtClean="0"/>
-              <a:t>19/05/2022</a:t>
+              <a:t>22/05/2022</a:t>
             </a:fld>
             <a:endParaRPr lang="es-ES"/>
           </a:p>
@@ -4836,7 +4836,7 @@
           </a:lstStyle>
           <a:p>
             <a:r>
-              <a:rPr lang="es-ES" smtClean="0"/>
+              <a:rPr lang="es-ES"/>
               <a:t>Haga clic para modificar el estilo de título del patrón</a:t>
             </a:r>
             <a:endParaRPr lang="en-US" dirty="0"/>
@@ -4924,7 +4924,7 @@
           </a:lstStyle>
           <a:p>
             <a:r>
-              <a:rPr lang="es-ES" smtClean="0"/>
+              <a:rPr lang="es-ES"/>
               <a:t>Haga clic en el icono para agregar una imagen</a:t>
             </a:r>
             <a:endParaRPr lang="en-US" dirty="0"/>
@@ -4992,7 +4992,7 @@
           <a:p>
             <a:pPr lvl="0"/>
             <a:r>
-              <a:rPr lang="es-ES" smtClean="0"/>
+              <a:rPr lang="es-ES"/>
               <a:t>Editar el estilo de texto del patrón</a:t>
             </a:r>
           </a:p>
@@ -5015,7 +5015,7 @@
           <a:p>
             <a:fld id="{40636F93-AAE2-4FC4-B77D-02B590E4C869}" type="datetimeFigureOut">
               <a:rPr lang="es-ES" smtClean="0"/>
-              <a:t>19/05/2022</a:t>
+              <a:t>22/05/2022</a:t>
             </a:fld>
             <a:endParaRPr lang="es-ES"/>
           </a:p>
@@ -5262,7 +5262,7 @@
           <a:lstStyle/>
           <a:p>
             <a:r>
-              <a:rPr lang="es-ES" smtClean="0"/>
+              <a:rPr lang="es-ES"/>
               <a:t>Haga clic para modificar el estilo de título del patrón</a:t>
             </a:r>
             <a:endParaRPr lang="en-US" dirty="0"/>
@@ -5296,35 +5296,35 @@
           <a:p>
             <a:pPr lvl="0"/>
             <a:r>
-              <a:rPr lang="es-ES" smtClean="0"/>
+              <a:rPr lang="es-ES"/>
               <a:t>Editar el estilo de texto del patrón</a:t>
             </a:r>
           </a:p>
           <a:p>
             <a:pPr lvl="1"/>
             <a:r>
-              <a:rPr lang="es-ES" smtClean="0"/>
+              <a:rPr lang="es-ES"/>
               <a:t>Segundo nivel</a:t>
             </a:r>
           </a:p>
           <a:p>
             <a:pPr lvl="2"/>
             <a:r>
-              <a:rPr lang="es-ES" smtClean="0"/>
+              <a:rPr lang="es-ES"/>
               <a:t>Tercer nivel</a:t>
             </a:r>
           </a:p>
           <a:p>
             <a:pPr lvl="3"/>
             <a:r>
-              <a:rPr lang="es-ES" smtClean="0"/>
+              <a:rPr lang="es-ES"/>
               <a:t>Cuarto nivel</a:t>
             </a:r>
           </a:p>
           <a:p>
             <a:pPr lvl="4"/>
             <a:r>
-              <a:rPr lang="es-ES" smtClean="0"/>
+              <a:rPr lang="es-ES"/>
               <a:t>Quinto nivel</a:t>
             </a:r>
             <a:endParaRPr lang="en-US" dirty="0"/>
@@ -5366,7 +5366,7 @@
           <a:p>
             <a:fld id="{40636F93-AAE2-4FC4-B77D-02B590E4C869}" type="datetimeFigureOut">
               <a:rPr lang="es-ES" smtClean="0"/>
-              <a:t>19/05/2022</a:t>
+              <a:t>22/05/2022</a:t>
             </a:fld>
             <a:endParaRPr lang="es-ES"/>
           </a:p>
@@ -5978,13 +5978,6 @@
   <p:clrMapOvr>
     <a:masterClrMapping/>
   </p:clrMapOvr>
-  <p:timing>
-    <p:tnLst>
-      <p:par>
-        <p:cTn id="1" dur="indefinite" restart="never" nodeType="tmRoot"/>
-      </p:par>
-    </p:tnLst>
-  </p:timing>
 </p:sld>
 </file>
 
@@ -6021,10 +6014,9 @@
           <a:lstStyle/>
           <a:p>
             <a:r>
-              <a:rPr lang="es-ES" dirty="0" smtClean="0"/>
+              <a:rPr lang="es-ES" dirty="0"/>
               <a:t>Bases de datos</a:t>
             </a:r>
-            <a:endParaRPr lang="es-ES" dirty="0"/>
           </a:p>
         </p:txBody>
       </p:sp>
@@ -6068,21 +6060,8 @@
           <a:p>
             <a:r>
               <a:rPr lang="es-ES" dirty="0"/>
-              <a:t>Nuestra base de </a:t>
-            </a:r>
-            <a:r>
-              <a:rPr lang="es-ES" dirty="0" smtClean="0"/>
-              <a:t>datos principalmente</a:t>
-            </a:r>
-            <a:r>
-              <a:rPr lang="es-ES" dirty="0"/>
-              <a:t>, se centra en almacenar datos de </a:t>
-            </a:r>
-            <a:r>
-              <a:rPr lang="es-ES" dirty="0" smtClean="0"/>
-              <a:t>los trabajadores, sus tareas, eventos, reuniones y los puntos para canjear en la tienda.</a:t>
-            </a:r>
-            <a:endParaRPr lang="es-ES" dirty="0"/>
+              <a:t>Nuestra base de datos principalmente, se centra en almacenar datos de los trabajadores, sus tareas, eventos, reuniones y los puntos para canjear en la tienda.</a:t>
+            </a:r>
           </a:p>
           <a:p>
             <a:endParaRPr lang="es-ES" dirty="0"/>
@@ -6123,13 +6102,6 @@
   <p:clrMapOvr>
     <a:masterClrMapping/>
   </p:clrMapOvr>
-  <p:timing>
-    <p:tnLst>
-      <p:par>
-        <p:cTn id="1" dur="indefinite" restart="never" nodeType="tmRoot"/>
-      </p:par>
-    </p:tnLst>
-  </p:timing>
 </p:sld>
 </file>
 
@@ -6166,68 +6138,67 @@
           <a:lstStyle/>
           <a:p>
             <a:r>
-              <a:rPr lang="es-ES" dirty="0" smtClean="0"/>
+              <a:rPr lang="es-ES" dirty="0"/>
               <a:t>Ventajas</a:t>
             </a:r>
+          </a:p>
+        </p:txBody>
+      </p:sp>
+      <p:sp>
+        <p:nvSpPr>
+          <p:cNvPr id="3" name="Marcador de contenido 2"/>
+          <p:cNvSpPr>
+            <a:spLocks noGrp="1"/>
+          </p:cNvSpPr>
+          <p:nvPr>
+            <p:ph idx="1"/>
+          </p:nvPr>
+        </p:nvSpPr>
+        <p:spPr/>
+        <p:txBody>
+          <a:bodyPr/>
+          <a:lstStyle/>
+          <a:p>
+            <a:r>
+              <a:rPr lang="es-ES" dirty="0"/>
+              <a:t>Tienda de puntos</a:t>
+            </a:r>
+          </a:p>
+          <a:p>
+            <a:r>
+              <a:rPr lang="es-ES" dirty="0" err="1"/>
+              <a:t>User-friendly</a:t>
+            </a:r>
             <a:endParaRPr lang="es-ES" dirty="0"/>
           </a:p>
-        </p:txBody>
-      </p:sp>
-      <p:sp>
-        <p:nvSpPr>
-          <p:cNvPr id="3" name="Marcador de contenido 2"/>
-          <p:cNvSpPr>
-            <a:spLocks noGrp="1"/>
-          </p:cNvSpPr>
-          <p:nvPr>
-            <p:ph idx="1"/>
-          </p:nvPr>
-        </p:nvSpPr>
-        <p:spPr/>
-        <p:txBody>
-          <a:bodyPr/>
-          <a:lstStyle/>
-          <a:p>
-            <a:r>
-              <a:rPr lang="es-ES" dirty="0" smtClean="0"/>
-              <a:t>Tienda de puntos</a:t>
-            </a:r>
-          </a:p>
-          <a:p>
-            <a:r>
-              <a:rPr lang="es-ES" dirty="0" err="1" smtClean="0"/>
-              <a:t>User-friendly</a:t>
-            </a:r>
-            <a:endParaRPr lang="es-ES" dirty="0" smtClean="0"/>
-          </a:p>
-          <a:p>
-            <a:r>
-              <a:rPr lang="es-ES" dirty="0" smtClean="0"/>
+          <a:p>
+            <a:r>
+              <a:rPr lang="es-ES" dirty="0"/>
               <a:t>Intuitiva</a:t>
             </a:r>
           </a:p>
           <a:p>
             <a:r>
-              <a:rPr lang="es-ES" dirty="0" err="1" smtClean="0"/>
+              <a:rPr lang="es-ES" dirty="0" err="1"/>
               <a:t>It</a:t>
             </a:r>
             <a:r>
-              <a:rPr lang="es-ES" dirty="0" smtClean="0"/>
+              <a:rPr lang="es-ES" dirty="0"/>
               <a:t> </a:t>
             </a:r>
             <a:r>
-              <a:rPr lang="es-ES" dirty="0" err="1" smtClean="0"/>
+              <a:rPr lang="es-ES" dirty="0" err="1"/>
               <a:t>just</a:t>
             </a:r>
             <a:r>
-              <a:rPr lang="es-ES" dirty="0" smtClean="0"/>
+              <a:rPr lang="es-ES" dirty="0"/>
               <a:t> </a:t>
             </a:r>
             <a:r>
-              <a:rPr lang="es-ES" dirty="0" err="1" smtClean="0"/>
+              <a:rPr lang="es-ES" dirty="0" err="1"/>
               <a:t>works</a:t>
             </a:r>
-            <a:endParaRPr lang="es-ES" dirty="0" smtClean="0"/>
+            <a:endParaRPr lang="es-ES" dirty="0"/>
           </a:p>
           <a:p>
             <a:endParaRPr lang="es-ES" dirty="0"/>
@@ -6244,13 +6215,6 @@
   <p:clrMapOvr>
     <a:masterClrMapping/>
   </p:clrMapOvr>
-  <p:timing>
-    <p:tnLst>
-      <p:par>
-        <p:cTn id="1" dur="indefinite" restart="never" nodeType="tmRoot"/>
-      </p:par>
-    </p:tnLst>
-  </p:timing>
 </p:sld>
 </file>
 
@@ -6287,10 +6251,9 @@
           <a:lstStyle/>
           <a:p>
             <a:r>
-              <a:rPr lang="es-ES" dirty="0" smtClean="0"/>
+              <a:rPr lang="es-ES" dirty="0"/>
               <a:t>Sitio web/Vista de la aplicación</a:t>
             </a:r>
-            <a:endParaRPr lang="es-ES" dirty="0"/>
           </a:p>
         </p:txBody>
       </p:sp>
@@ -6315,10 +6278,40 @@
               </a:rPr>
               <a:t>http://pi-grupo-verde.s3-website-us-east-1.amazonaws.com/</a:t>
             </a:r>
-            <a:endParaRPr lang="es-ES" dirty="0" smtClean="0"/>
-          </a:p>
-        </p:txBody>
-      </p:sp>
+            <a:endParaRPr lang="es-ES" dirty="0"/>
+          </a:p>
+        </p:txBody>
+      </p:sp>
+      <p:pic>
+        <p:nvPicPr>
+          <p:cNvPr id="5" name="Imagen 4">
+            <a:extLst>
+              <a:ext uri="{FF2B5EF4-FFF2-40B4-BE49-F238E27FC236}">
+                <a16:creationId xmlns:a16="http://schemas.microsoft.com/office/drawing/2014/main" id="{4597994E-70D2-C5F0-9347-A30C1077DD3B}"/>
+              </a:ext>
+            </a:extLst>
+          </p:cNvPr>
+          <p:cNvPicPr>
+            <a:picLocks noChangeAspect="1"/>
+          </p:cNvPicPr>
+          <p:nvPr/>
+        </p:nvPicPr>
+        <p:blipFill>
+          <a:blip r:embed="rId3"/>
+          <a:stretch>
+            <a:fillRect/>
+          </a:stretch>
+        </p:blipFill>
+        <p:spPr>
+          <a:xfrm>
+            <a:off x="2618832" y="3039739"/>
+            <a:ext cx="6368150" cy="2931275"/>
+          </a:xfrm>
+          <a:prstGeom prst="rect">
+            <a:avLst/>
+          </a:prstGeom>
+        </p:spPr>
+      </p:pic>
     </p:spTree>
     <p:extLst>
       <p:ext uri="{BB962C8B-B14F-4D97-AF65-F5344CB8AC3E}">
@@ -6329,13 +6322,6 @@
   <p:clrMapOvr>
     <a:masterClrMapping/>
   </p:clrMapOvr>
-  <p:timing>
-    <p:tnLst>
-      <p:par>
-        <p:cTn id="1" dur="indefinite" restart="never" nodeType="tmRoot"/>
-      </p:par>
-    </p:tnLst>
-  </p:timing>
 </p:sld>
 </file>
 
@@ -6372,10 +6358,9 @@
           <a:lstStyle/>
           <a:p>
             <a:r>
-              <a:rPr lang="es-ES" dirty="0" smtClean="0"/>
+              <a:rPr lang="es-ES" dirty="0"/>
               <a:t>Herramientas utilizadas</a:t>
             </a:r>
-            <a:endParaRPr lang="es-ES" dirty="0"/>
           </a:p>
         </p:txBody>
       </p:sp>
@@ -6402,7 +6387,7 @@
         <p:spPr>
           <a:xfrm>
             <a:off x="1358538" y="2410097"/>
-            <a:ext cx="1053736" cy="1308463"/>
+            <a:ext cx="1240164" cy="1539958"/>
           </a:xfrm>
           <a:prstGeom prst="rect">
             <a:avLst/>
@@ -6555,6 +6540,78 @@
           </a:prstGeom>
         </p:spPr>
       </p:pic>
+      <p:pic>
+        <p:nvPicPr>
+          <p:cNvPr id="8" name="Imagen 7" descr="Icono&#10;&#10;Descripción generada automáticamente">
+            <a:extLst>
+              <a:ext uri="{FF2B5EF4-FFF2-40B4-BE49-F238E27FC236}">
+                <a16:creationId xmlns:a16="http://schemas.microsoft.com/office/drawing/2014/main" id="{5EB518F1-520B-4F37-FC44-43BCC573D1F3}"/>
+              </a:ext>
+            </a:extLst>
+          </p:cNvPr>
+          <p:cNvPicPr>
+            <a:picLocks noChangeAspect="1"/>
+          </p:cNvPicPr>
+          <p:nvPr/>
+        </p:nvPicPr>
+        <p:blipFill>
+          <a:blip r:embed="rId8" cstate="print">
+            <a:extLst>
+              <a:ext uri="{28A0092B-C50C-407E-A947-70E740481C1C}">
+                <a14:useLocalDpi xmlns:a14="http://schemas.microsoft.com/office/drawing/2010/main" val="0"/>
+              </a:ext>
+            </a:extLst>
+          </a:blip>
+          <a:stretch>
+            <a:fillRect/>
+          </a:stretch>
+        </p:blipFill>
+        <p:spPr>
+          <a:xfrm>
+            <a:off x="5569370" y="4215001"/>
+            <a:ext cx="2978118" cy="1687997"/>
+          </a:xfrm>
+          <a:prstGeom prst="rect">
+            <a:avLst/>
+          </a:prstGeom>
+        </p:spPr>
+      </p:pic>
+      <p:pic>
+        <p:nvPicPr>
+          <p:cNvPr id="12" name="Imagen 11" descr="Logotipo&#10;&#10;Descripción generada automáticamente">
+            <a:extLst>
+              <a:ext uri="{FF2B5EF4-FFF2-40B4-BE49-F238E27FC236}">
+                <a16:creationId xmlns:a16="http://schemas.microsoft.com/office/drawing/2014/main" id="{1D5189A0-30A2-2561-A494-87E79902150F}"/>
+              </a:ext>
+            </a:extLst>
+          </p:cNvPr>
+          <p:cNvPicPr>
+            <a:picLocks noChangeAspect="1"/>
+          </p:cNvPicPr>
+          <p:nvPr/>
+        </p:nvPicPr>
+        <p:blipFill>
+          <a:blip r:embed="rId9" cstate="print">
+            <a:extLst>
+              <a:ext uri="{28A0092B-C50C-407E-A947-70E740481C1C}">
+                <a14:useLocalDpi xmlns:a14="http://schemas.microsoft.com/office/drawing/2010/main" val="0"/>
+              </a:ext>
+            </a:extLst>
+          </a:blip>
+          <a:stretch>
+            <a:fillRect/>
+          </a:stretch>
+        </p:blipFill>
+        <p:spPr>
+          <a:xfrm>
+            <a:off x="8159088" y="4822980"/>
+            <a:ext cx="2610511" cy="535359"/>
+          </a:xfrm>
+          <a:prstGeom prst="rect">
+            <a:avLst/>
+          </a:prstGeom>
+        </p:spPr>
+      </p:pic>
     </p:spTree>
     <p:extLst>
       <p:ext uri="{BB962C8B-B14F-4D97-AF65-F5344CB8AC3E}">
@@ -6565,13 +6622,6 @@
   <p:clrMapOvr>
     <a:masterClrMapping/>
   </p:clrMapOvr>
-  <p:timing>
-    <p:tnLst>
-      <p:par>
-        <p:cTn id="1" dur="indefinite" restart="never" nodeType="tmRoot"/>
-      </p:par>
-    </p:tnLst>
-  </p:timing>
 </p:sld>
 </file>
 
@@ -6608,36 +6658,87 @@
           <a:lstStyle/>
           <a:p>
             <a:r>
-              <a:rPr lang="es-ES" dirty="0" smtClean="0"/>
+              <a:rPr lang="es-ES" dirty="0"/>
               <a:t>Adversidades encontradas</a:t>
             </a:r>
+          </a:p>
+        </p:txBody>
+      </p:sp>
+      <p:sp>
+        <p:nvSpPr>
+          <p:cNvPr id="6" name="Marcador de contenido 5"/>
+          <p:cNvSpPr>
+            <a:spLocks noGrp="1"/>
+          </p:cNvSpPr>
+          <p:nvPr>
+            <p:ph idx="1"/>
+          </p:nvPr>
+        </p:nvSpPr>
+        <p:spPr/>
+        <p:txBody>
+          <a:bodyPr/>
+          <a:lstStyle/>
+          <a:p>
+            <a:r>
+              <a:rPr lang="es-ES" dirty="0"/>
+              <a:t>Problemas en la BD</a:t>
+            </a:r>
+          </a:p>
+          <a:p>
+            <a:r>
+              <a:rPr lang="es-ES" dirty="0"/>
+              <a:t>Gestión del usuario</a:t>
+            </a:r>
+          </a:p>
+          <a:p>
+            <a:r>
+              <a:rPr lang="es-ES" dirty="0"/>
+              <a:t>Problemas con </a:t>
+            </a:r>
+            <a:r>
+              <a:rPr lang="es-ES" dirty="0" err="1"/>
+              <a:t>Github</a:t>
+            </a:r>
             <a:endParaRPr lang="es-ES" dirty="0"/>
           </a:p>
         </p:txBody>
       </p:sp>
-      <p:sp>
-        <p:nvSpPr>
-          <p:cNvPr id="6" name="Marcador de contenido 5"/>
-          <p:cNvSpPr>
-            <a:spLocks noGrp="1"/>
-          </p:cNvSpPr>
-          <p:nvPr>
-            <p:ph idx="1"/>
-          </p:nvPr>
-        </p:nvSpPr>
-        <p:spPr/>
-        <p:txBody>
-          <a:bodyPr/>
-          <a:lstStyle/>
-          <a:p>
-            <a:r>
-              <a:rPr lang="es-ES" dirty="0" smtClean="0"/>
-              <a:t>Buscar foto</a:t>
-            </a:r>
-            <a:endParaRPr lang="es-ES" dirty="0"/>
-          </a:p>
-        </p:txBody>
-      </p:sp>
+      <p:pic>
+        <p:nvPicPr>
+          <p:cNvPr id="4" name="Imagen 3" descr="Texto&#10;&#10;Descripción generada automáticamente">
+            <a:extLst>
+              <a:ext uri="{FF2B5EF4-FFF2-40B4-BE49-F238E27FC236}">
+                <a16:creationId xmlns:a16="http://schemas.microsoft.com/office/drawing/2014/main" id="{90CB1877-FB77-0228-BA11-16350798065C}"/>
+              </a:ext>
+            </a:extLst>
+          </p:cNvPr>
+          <p:cNvPicPr>
+            <a:picLocks noChangeAspect="1"/>
+          </p:cNvPicPr>
+          <p:nvPr/>
+        </p:nvPicPr>
+        <p:blipFill>
+          <a:blip r:embed="rId2" cstate="print">
+            <a:extLst>
+              <a:ext uri="{28A0092B-C50C-407E-A947-70E740481C1C}">
+                <a14:useLocalDpi xmlns:a14="http://schemas.microsoft.com/office/drawing/2010/main" val="0"/>
+              </a:ext>
+            </a:extLst>
+          </a:blip>
+          <a:stretch>
+            <a:fillRect/>
+          </a:stretch>
+        </p:blipFill>
+        <p:spPr>
+          <a:xfrm>
+            <a:off x="5271356" y="2431472"/>
+            <a:ext cx="4060571" cy="3569856"/>
+          </a:xfrm>
+          <a:prstGeom prst="rect">
+            <a:avLst/>
+          </a:prstGeom>
+        </p:spPr>
+      </p:pic>
     </p:spTree>
     <p:extLst>
       <p:ext uri="{BB962C8B-B14F-4D97-AF65-F5344CB8AC3E}">
@@ -6648,13 +6749,6 @@
   <p:clrMapOvr>
     <a:masterClrMapping/>
   </p:clrMapOvr>
-  <p:timing>
-    <p:tnLst>
-      <p:par>
-        <p:cTn id="1" dur="indefinite" restart="never" nodeType="tmRoot"/>
-      </p:par>
-    </p:tnLst>
-  </p:timing>
 </p:sld>
 </file>
 
@@ -6691,10 +6785,9 @@
           <a:lstStyle/>
           <a:p>
             <a:r>
-              <a:rPr lang="es-ES" dirty="0" smtClean="0"/>
+              <a:rPr lang="es-ES" dirty="0"/>
               <a:t>Conclusión</a:t>
             </a:r>
-            <a:endParaRPr lang="es-ES" dirty="0"/>
           </a:p>
         </p:txBody>
       </p:sp>
@@ -6714,16 +6807,15 @@
           <a:lstStyle/>
           <a:p>
             <a:r>
-              <a:rPr lang="es-ES" dirty="0" smtClean="0"/>
+              <a:rPr lang="es-ES" dirty="0"/>
               <a:t>Sirve para organizar a los empleados</a:t>
             </a:r>
           </a:p>
           <a:p>
             <a:r>
-              <a:rPr lang="es-ES" dirty="0" smtClean="0"/>
+              <a:rPr lang="es-ES" dirty="0"/>
               <a:t>Va dirigida tanto para los empleados como para el trabajador</a:t>
             </a:r>
-            <a:endParaRPr lang="es-ES" dirty="0"/>
           </a:p>
         </p:txBody>
       </p:sp>
@@ -6737,13 +6829,6 @@
   <p:clrMapOvr>
     <a:masterClrMapping/>
   </p:clrMapOvr>
-  <p:timing>
-    <p:tnLst>
-      <p:par>
-        <p:cTn id="1" dur="indefinite" restart="never" nodeType="tmRoot"/>
-      </p:par>
-    </p:tnLst>
-  </p:timing>
 </p:sld>
 </file>
 
@@ -6780,10 +6865,9 @@
           <a:lstStyle/>
           <a:p>
             <a:r>
-              <a:rPr lang="es-ES" dirty="0" smtClean="0"/>
+              <a:rPr lang="es-ES" dirty="0"/>
               <a:t>Índice</a:t>
             </a:r>
-            <a:endParaRPr lang="es-ES" dirty="0"/>
           </a:p>
         </p:txBody>
       </p:sp>
@@ -6810,39 +6894,26 @@
           <a:lstStyle/>
           <a:p>
             <a:r>
-              <a:rPr lang="es-ES" sz="1900" dirty="0" smtClean="0"/>
-              <a:t>Como surgió la </a:t>
-            </a:r>
-            <a:r>
-              <a:rPr lang="es-ES" sz="1900" dirty="0" smtClean="0"/>
-              <a:t>idea</a:t>
-            </a:r>
-            <a:endParaRPr lang="es-ES" sz="1900" dirty="0" smtClean="0"/>
-          </a:p>
-          <a:p>
-            <a:r>
-              <a:rPr lang="es-ES" sz="1900" dirty="0" smtClean="0"/>
+              <a:rPr lang="es-ES" sz="1900" dirty="0"/>
+              <a:t>Como surgió la idea</a:t>
+            </a:r>
+          </a:p>
+          <a:p>
+            <a:r>
+              <a:rPr lang="es-ES" sz="1900" dirty="0"/>
               <a:t>El logo</a:t>
             </a:r>
           </a:p>
           <a:p>
             <a:r>
-              <a:rPr lang="es-ES" sz="1900" dirty="0" smtClean="0"/>
+              <a:rPr lang="es-ES" sz="1900" dirty="0"/>
               <a:t>Nombre de la Aplicación</a:t>
             </a:r>
           </a:p>
           <a:p>
             <a:r>
-              <a:rPr lang="es-ES" sz="1900" dirty="0" smtClean="0"/>
-              <a:t>Base </a:t>
-            </a:r>
-            <a:r>
-              <a:rPr lang="es-ES" sz="1900" dirty="0" smtClean="0"/>
-              <a:t>de </a:t>
-            </a:r>
-            <a:r>
-              <a:rPr lang="es-ES" sz="1900" dirty="0" smtClean="0"/>
-              <a:t>Datos</a:t>
+              <a:rPr lang="es-ES" sz="1900" dirty="0"/>
+              <a:t>Base de Datos</a:t>
             </a:r>
           </a:p>
           <a:p>
@@ -6890,7 +6961,7 @@
             <a:pPr marL="0" indent="0">
               <a:buNone/>
             </a:pPr>
-            <a:endParaRPr lang="es-ES" sz="1600" dirty="0" smtClean="0"/>
+            <a:endParaRPr lang="es-ES" sz="1600" dirty="0"/>
           </a:p>
         </p:txBody>
       </p:sp>
@@ -6904,13 +6975,6 @@
   <p:clrMapOvr>
     <a:masterClrMapping/>
   </p:clrMapOvr>
-  <p:timing>
-    <p:tnLst>
-      <p:par>
-        <p:cTn id="1" dur="indefinite" restart="never" nodeType="tmRoot"/>
-      </p:par>
-    </p:tnLst>
-  </p:timing>
 </p:sld>
 </file>
 
@@ -6952,7 +7016,7 @@
           <a:lstStyle/>
           <a:p>
             <a:r>
-              <a:rPr lang="es-ES" dirty="0" err="1" smtClean="0"/>
+              <a:rPr lang="es-ES" dirty="0" err="1"/>
               <a:t>Worktab</a:t>
             </a:r>
             <a:endParaRPr lang="es-ES" dirty="0"/>
@@ -6985,32 +7049,22 @@
               <a:buNone/>
             </a:pPr>
             <a:r>
-              <a:rPr lang="es-ES" dirty="0" err="1" smtClean="0"/>
+              <a:rPr lang="es-ES" dirty="0" err="1"/>
               <a:t>Worktab</a:t>
             </a:r>
             <a:r>
-              <a:rPr lang="es-ES" dirty="0" smtClean="0"/>
-              <a:t> surgió </a:t>
-            </a:r>
-            <a:r>
-              <a:rPr lang="es-ES" dirty="0" smtClean="0"/>
-              <a:t>de la combinación de todas nuestras propuestas.</a:t>
-            </a:r>
-            <a:endParaRPr lang="es-ES" dirty="0" smtClean="0"/>
+              <a:rPr lang="es-ES" dirty="0"/>
+              <a:t> surgió de la combinación de todas nuestras propuestas.</a:t>
+            </a:r>
           </a:p>
           <a:p>
             <a:pPr marL="0" indent="0">
               <a:buNone/>
             </a:pPr>
             <a:r>
-              <a:rPr lang="es-ES" dirty="0" smtClean="0"/>
-              <a:t>Así generamos una aplicación bastante única capaz de organizar el trabajo y motivar al </a:t>
-            </a:r>
-            <a:r>
-              <a:rPr lang="es-ES" dirty="0" smtClean="0"/>
-              <a:t>trabajador.</a:t>
-            </a:r>
-            <a:endParaRPr lang="es-ES" dirty="0"/>
+              <a:rPr lang="es-ES" dirty="0"/>
+              <a:t>Así generamos una aplicación bastante única capaz de organizar el trabajo y motivar al trabajador.</a:t>
+            </a:r>
           </a:p>
         </p:txBody>
       </p:sp>
@@ -7085,13 +7139,6 @@
   <p:clrMapOvr>
     <a:masterClrMapping/>
   </p:clrMapOvr>
-  <p:timing>
-    <p:tnLst>
-      <p:par>
-        <p:cTn id="1" dur="indefinite" restart="never" nodeType="tmRoot"/>
-      </p:par>
-    </p:tnLst>
-  </p:timing>
 </p:sld>
 </file>
 
@@ -7128,10 +7175,9 @@
           <a:lstStyle/>
           <a:p>
             <a:r>
-              <a:rPr lang="es-ES" dirty="0" smtClean="0"/>
+              <a:rPr lang="es-ES" dirty="0"/>
               <a:t>¿A quién va dirigido?</a:t>
             </a:r>
-            <a:endParaRPr lang="es-ES" dirty="0"/>
           </a:p>
         </p:txBody>
       </p:sp>
@@ -7156,16 +7202,15 @@
           <a:lstStyle/>
           <a:p>
             <a:r>
-              <a:rPr lang="es-ES" dirty="0" smtClean="0"/>
+              <a:rPr lang="es-ES" dirty="0"/>
               <a:t>Empleados</a:t>
             </a:r>
           </a:p>
           <a:p>
             <a:r>
-              <a:rPr lang="es-ES" dirty="0" smtClean="0"/>
+              <a:rPr lang="es-ES" dirty="0"/>
               <a:t>Empresas</a:t>
             </a:r>
-            <a:endParaRPr lang="es-ES" dirty="0"/>
           </a:p>
         </p:txBody>
       </p:sp>
@@ -7220,10 +7265,9 @@
           <a:lstStyle/>
           <a:p>
             <a:r>
-              <a:rPr lang="es-ES" dirty="0" smtClean="0"/>
+              <a:rPr lang="es-ES" dirty="0"/>
               <a:t>El Logo</a:t>
             </a:r>
-            <a:endParaRPr lang="es-ES" dirty="0"/>
           </a:p>
         </p:txBody>
       </p:sp>
@@ -7248,10 +7292,9 @@
           <a:lstStyle/>
           <a:p>
             <a:r>
-              <a:rPr lang="es-ES" dirty="0" smtClean="0"/>
+              <a:rPr lang="es-ES" dirty="0"/>
               <a:t>El logo está todavía en desarrollo</a:t>
             </a:r>
-            <a:endParaRPr lang="es-ES" dirty="0"/>
           </a:p>
         </p:txBody>
       </p:sp>
@@ -7295,13 +7338,6 @@
   <p:clrMapOvr>
     <a:masterClrMapping/>
   </p:clrMapOvr>
-  <p:timing>
-    <p:tnLst>
-      <p:par>
-        <p:cTn id="1" dur="indefinite" restart="never" nodeType="tmRoot"/>
-      </p:par>
-    </p:tnLst>
-  </p:timing>
 </p:sld>
 </file>
 
@@ -7338,10 +7374,9 @@
           <a:lstStyle/>
           <a:p>
             <a:r>
-              <a:rPr lang="es-ES" dirty="0" smtClean="0"/>
+              <a:rPr lang="es-ES" dirty="0"/>
               <a:t>Nombre de la aplicación </a:t>
             </a:r>
-            <a:endParaRPr lang="es-ES" dirty="0"/>
           </a:p>
         </p:txBody>
       </p:sp>
@@ -7366,10 +7401,9 @@
           <a:lstStyle/>
           <a:p>
             <a:r>
-              <a:rPr lang="es-ES" dirty="0" smtClean="0"/>
+              <a:rPr lang="es-ES" dirty="0"/>
               <a:t>El nombre se debe a cómo utilizamos la navegación entre pestañas para desempeñar las diferentes funcionalidades que tiene nuestra aplicación.</a:t>
             </a:r>
-            <a:endParaRPr lang="es-ES" dirty="0"/>
           </a:p>
         </p:txBody>
       </p:sp>
@@ -7407,13 +7441,6 @@
   <p:clrMapOvr>
     <a:masterClrMapping/>
   </p:clrMapOvr>
-  <p:timing>
-    <p:tnLst>
-      <p:par>
-        <p:cTn id="1" dur="indefinite" restart="never" nodeType="tmRoot"/>
-      </p:par>
-    </p:tnLst>
-  </p:timing>
 </p:sld>
 </file>
 
@@ -7450,10 +7477,9 @@
           <a:lstStyle/>
           <a:p>
             <a:r>
-              <a:rPr lang="es-ES" dirty="0" smtClean="0"/>
+              <a:rPr lang="es-ES" dirty="0"/>
               <a:t>Vista principal</a:t>
             </a:r>
-            <a:endParaRPr lang="es-ES" dirty="0"/>
           </a:p>
         </p:txBody>
       </p:sp>
@@ -7553,10 +7579,9 @@
           <a:lstStyle/>
           <a:p>
             <a:r>
-              <a:rPr lang="es-ES" dirty="0" smtClean="0"/>
+              <a:rPr lang="es-ES" dirty="0"/>
               <a:t>Diferentes funcionalidades</a:t>
             </a:r>
-            <a:endParaRPr lang="es-ES" dirty="0"/>
           </a:p>
         </p:txBody>
       </p:sp>
@@ -7654,10 +7679,9 @@
           <a:lstStyle/>
           <a:p>
             <a:r>
-              <a:rPr lang="es-ES" dirty="0" smtClean="0"/>
+              <a:rPr lang="es-ES" dirty="0"/>
               <a:t>Diferentes funcionalidades</a:t>
             </a:r>
-            <a:endParaRPr lang="es-ES" dirty="0"/>
           </a:p>
         </p:txBody>
       </p:sp>

</xml_diff>